<commit_message>
Criação e adição do slide com o desenho de solução. -Feito por Ricardo e Matheus
</commit_message>
<xml_diff>
--- a/CONTEXTUALIZAÇÃO/CONTROL BLOCK.pptx
+++ b/CONTEXTUALIZAÇÃO/CONTROL BLOCK.pptx
@@ -11,6 +11,7 @@
     <p:sldId id="262" r:id="rId5"/>
     <p:sldId id="259" r:id="rId6"/>
     <p:sldId id="261" r:id="rId7"/>
+    <p:sldId id="263" r:id="rId8"/>
   </p:sldIdLst>
   <p:sldSz cx="12192000" cy="6858000"/>
   <p:notesSz cx="6858000" cy="9144000"/>
@@ -339,7 +340,7 @@
           <a:p>
             <a:fld id="{246311BE-0CA7-4D6F-B70B-9BF691300505}" type="slidenum">
               <a:rPr lang="en-US" smtClean="0"/>
-              <a:t>‹nº›</a:t>
+              <a:t>‹#›</a:t>
             </a:fld>
             <a:endParaRPr lang="en-US"/>
           </a:p>
@@ -596,7 +597,7 @@
           <a:p>
             <a:fld id="{246311BE-0CA7-4D6F-B70B-9BF691300505}" type="slidenum">
               <a:rPr lang="en-US" smtClean="0"/>
-              <a:t>‹nº›</a:t>
+              <a:t>‹#›</a:t>
             </a:fld>
             <a:endParaRPr lang="en-US"/>
           </a:p>
@@ -837,7 +838,7 @@
           <a:p>
             <a:fld id="{246311BE-0CA7-4D6F-B70B-9BF691300505}" type="slidenum">
               <a:rPr lang="en-US" smtClean="0"/>
-              <a:t>‹nº›</a:t>
+              <a:t>‹#›</a:t>
             </a:fld>
             <a:endParaRPr lang="en-US"/>
           </a:p>
@@ -1147,7 +1148,7 @@
           <a:p>
             <a:fld id="{246311BE-0CA7-4D6F-B70B-9BF691300505}" type="slidenum">
               <a:rPr lang="en-US" smtClean="0"/>
-              <a:t>‹nº›</a:t>
+              <a:t>‹#›</a:t>
             </a:fld>
             <a:endParaRPr lang="en-US"/>
           </a:p>
@@ -1620,7 +1621,7 @@
           <a:p>
             <a:fld id="{246311BE-0CA7-4D6F-B70B-9BF691300505}" type="slidenum">
               <a:rPr lang="en-US" smtClean="0"/>
-              <a:t>‹nº›</a:t>
+              <a:t>‹#›</a:t>
             </a:fld>
             <a:endParaRPr lang="en-US"/>
           </a:p>
@@ -2157,7 +2158,7 @@
           <a:p>
             <a:fld id="{246311BE-0CA7-4D6F-B70B-9BF691300505}" type="slidenum">
               <a:rPr lang="en-US" smtClean="0"/>
-              <a:t>‹nº›</a:t>
+              <a:t>‹#›</a:t>
             </a:fld>
             <a:endParaRPr lang="en-US"/>
           </a:p>
@@ -2931,7 +2932,7 @@
           <a:p>
             <a:fld id="{246311BE-0CA7-4D6F-B70B-9BF691300505}" type="slidenum">
               <a:rPr lang="en-US" smtClean="0"/>
-              <a:t>‹nº›</a:t>
+              <a:t>‹#›</a:t>
             </a:fld>
             <a:endParaRPr lang="en-US"/>
           </a:p>
@@ -3106,7 +3107,7 @@
           <a:p>
             <a:fld id="{246311BE-0CA7-4D6F-B70B-9BF691300505}" type="slidenum">
               <a:rPr lang="en-US" smtClean="0"/>
-              <a:t>‹nº›</a:t>
+              <a:t>‹#›</a:t>
             </a:fld>
             <a:endParaRPr lang="en-US"/>
           </a:p>
@@ -3339,7 +3340,7 @@
           <a:p>
             <a:fld id="{246311BE-0CA7-4D6F-B70B-9BF691300505}" type="slidenum">
               <a:rPr lang="en-US" smtClean="0"/>
-              <a:t>‹nº›</a:t>
+              <a:t>‹#›</a:t>
             </a:fld>
             <a:endParaRPr lang="en-US"/>
           </a:p>
@@ -3509,7 +3510,7 @@
           <a:p>
             <a:fld id="{246311BE-0CA7-4D6F-B70B-9BF691300505}" type="slidenum">
               <a:rPr lang="en-US" smtClean="0"/>
-              <a:t>‹nº›</a:t>
+              <a:t>‹#›</a:t>
             </a:fld>
             <a:endParaRPr lang="en-US"/>
           </a:p>
@@ -3808,7 +3809,7 @@
           <a:p>
             <a:fld id="{246311BE-0CA7-4D6F-B70B-9BF691300505}" type="slidenum">
               <a:rPr lang="en-US" smtClean="0"/>
-              <a:t>‹nº›</a:t>
+              <a:t>‹#›</a:t>
             </a:fld>
             <a:endParaRPr lang="en-US"/>
           </a:p>
@@ -4040,7 +4041,7 @@
           <a:p>
             <a:fld id="{246311BE-0CA7-4D6F-B70B-9BF691300505}" type="slidenum">
               <a:rPr lang="en-US" smtClean="0"/>
-              <a:t>‹nº›</a:t>
+              <a:t>‹#›</a:t>
             </a:fld>
             <a:endParaRPr lang="en-US"/>
           </a:p>
@@ -4419,7 +4420,7 @@
           <a:p>
             <a:fld id="{246311BE-0CA7-4D6F-B70B-9BF691300505}" type="slidenum">
               <a:rPr lang="en-US" smtClean="0"/>
-              <a:t>‹nº›</a:t>
+              <a:t>‹#›</a:t>
             </a:fld>
             <a:endParaRPr lang="en-US"/>
           </a:p>
@@ -4537,7 +4538,7 @@
           <a:p>
             <a:fld id="{246311BE-0CA7-4D6F-B70B-9BF691300505}" type="slidenum">
               <a:rPr lang="en-US" smtClean="0"/>
-              <a:t>‹nº›</a:t>
+              <a:t>‹#›</a:t>
             </a:fld>
             <a:endParaRPr lang="en-US"/>
           </a:p>
@@ -4632,7 +4633,7 @@
           <a:p>
             <a:fld id="{246311BE-0CA7-4D6F-B70B-9BF691300505}" type="slidenum">
               <a:rPr lang="en-US" smtClean="0"/>
-              <a:t>‹nº›</a:t>
+              <a:t>‹#›</a:t>
             </a:fld>
             <a:endParaRPr lang="en-US"/>
           </a:p>
@@ -4881,7 +4882,7 @@
           <a:p>
             <a:fld id="{246311BE-0CA7-4D6F-B70B-9BF691300505}" type="slidenum">
               <a:rPr lang="en-US" smtClean="0"/>
-              <a:t>‹nº›</a:t>
+              <a:t>‹#›</a:t>
             </a:fld>
             <a:endParaRPr lang="en-US"/>
           </a:p>
@@ -5138,7 +5139,7 @@
           <a:p>
             <a:fld id="{246311BE-0CA7-4D6F-B70B-9BF691300505}" type="slidenum">
               <a:rPr lang="en-US" smtClean="0"/>
-              <a:t>‹nº›</a:t>
+              <a:t>‹#›</a:t>
             </a:fld>
             <a:endParaRPr lang="en-US"/>
           </a:p>
@@ -5417,7 +5418,7 @@
           <a:p>
             <a:fld id="{246311BE-0CA7-4D6F-B70B-9BF691300505}" type="slidenum">
               <a:rPr lang="en-US" smtClean="0"/>
-              <a:t>‹nº›</a:t>
+              <a:t>‹#›</a:t>
             </a:fld>
             <a:endParaRPr lang="en-US"/>
           </a:p>
@@ -5768,7 +5769,7 @@
           <p:cNvPr id="5" name="Picture 4">
             <a:extLst>
               <a:ext uri="{FF2B5EF4-FFF2-40B4-BE49-F238E27FC236}">
-                <a16:creationId xmlns:a16="http://schemas.microsoft.com/office/drawing/2014/main" id="{1B11FD5A-5699-4ECF-AA91-A85CB4AE659F}"/>
+                <a16:creationId xmlns:a16="http://schemas.microsoft.com/office/drawing/2014/main" xmlns="" id="{1B11FD5A-5699-4ECF-AA91-A85CB4AE659F}"/>
               </a:ext>
             </a:extLst>
           </p:cNvPr>
@@ -5799,7 +5800,7 @@
           <p:cNvPr id="2" name="Title 1">
             <a:extLst>
               <a:ext uri="{FF2B5EF4-FFF2-40B4-BE49-F238E27FC236}">
-                <a16:creationId xmlns:a16="http://schemas.microsoft.com/office/drawing/2014/main" id="{370C220C-F90F-4C37-9636-5EB6847CD125}"/>
+                <a16:creationId xmlns:a16="http://schemas.microsoft.com/office/drawing/2014/main" xmlns="" id="{370C220C-F90F-4C37-9636-5EB6847CD125}"/>
               </a:ext>
             </a:extLst>
           </p:cNvPr>
@@ -5846,7 +5847,7 @@
           <p:cNvPr id="3" name="Subtitle 2">
             <a:extLst>
               <a:ext uri="{FF2B5EF4-FFF2-40B4-BE49-F238E27FC236}">
-                <a16:creationId xmlns:a16="http://schemas.microsoft.com/office/drawing/2014/main" id="{58AB3A8B-7016-439E-BE0E-B1CA10D4E81F}"/>
+                <a16:creationId xmlns:a16="http://schemas.microsoft.com/office/drawing/2014/main" xmlns="" id="{58AB3A8B-7016-439E-BE0E-B1CA10D4E81F}"/>
               </a:ext>
             </a:extLst>
           </p:cNvPr>
@@ -5924,7 +5925,7 @@
           <p:cNvPr id="2" name="Title 1">
             <a:extLst>
               <a:ext uri="{FF2B5EF4-FFF2-40B4-BE49-F238E27FC236}">
-                <a16:creationId xmlns:a16="http://schemas.microsoft.com/office/drawing/2014/main" id="{8136CCB2-2CD7-4DBC-AA6D-E2F97F0F6421}"/>
+                <a16:creationId xmlns:a16="http://schemas.microsoft.com/office/drawing/2014/main" xmlns="" id="{8136CCB2-2CD7-4DBC-AA6D-E2F97F0F6421}"/>
               </a:ext>
             </a:extLst>
           </p:cNvPr>
@@ -5980,7 +5981,7 @@
           <p:cNvPr id="3" name="Content Placeholder 2">
             <a:extLst>
               <a:ext uri="{FF2B5EF4-FFF2-40B4-BE49-F238E27FC236}">
-                <a16:creationId xmlns:a16="http://schemas.microsoft.com/office/drawing/2014/main" id="{7C05C4C4-6EEC-4661-9A27-B3DF5C44249B}"/>
+                <a16:creationId xmlns:a16="http://schemas.microsoft.com/office/drawing/2014/main" xmlns="" id="{7C05C4C4-6EEC-4661-9A27-B3DF5C44249B}"/>
               </a:ext>
             </a:extLst>
           </p:cNvPr>
@@ -6024,7 +6025,7 @@
           <p:cNvPr id="4" name="Title 1">
             <a:extLst>
               <a:ext uri="{FF2B5EF4-FFF2-40B4-BE49-F238E27FC236}">
-                <a16:creationId xmlns:a16="http://schemas.microsoft.com/office/drawing/2014/main" id="{8136CCB2-2CD7-4DBC-AA6D-E2F97F0F6421}"/>
+                <a16:creationId xmlns:a16="http://schemas.microsoft.com/office/drawing/2014/main" xmlns="" id="{8136CCB2-2CD7-4DBC-AA6D-E2F97F0F6421}"/>
               </a:ext>
             </a:extLst>
           </p:cNvPr>
@@ -6099,7 +6100,7 @@
           <p:cNvPr id="5" name="Content Placeholder 2">
             <a:extLst>
               <a:ext uri="{FF2B5EF4-FFF2-40B4-BE49-F238E27FC236}">
-                <a16:creationId xmlns:a16="http://schemas.microsoft.com/office/drawing/2014/main" id="{7C05C4C4-6EEC-4661-9A27-B3DF5C44249B}"/>
+                <a16:creationId xmlns:a16="http://schemas.microsoft.com/office/drawing/2014/main" xmlns="" id="{7C05C4C4-6EEC-4661-9A27-B3DF5C44249B}"/>
               </a:ext>
             </a:extLst>
           </p:cNvPr>
@@ -6325,7 +6326,7 @@
           <p:cNvPr id="6" name="Content Placeholder 2">
             <a:extLst>
               <a:ext uri="{FF2B5EF4-FFF2-40B4-BE49-F238E27FC236}">
-                <a16:creationId xmlns:a16="http://schemas.microsoft.com/office/drawing/2014/main" id="{7C05C4C4-6EEC-4661-9A27-B3DF5C44249B}"/>
+                <a16:creationId xmlns:a16="http://schemas.microsoft.com/office/drawing/2014/main" xmlns="" id="{7C05C4C4-6EEC-4661-9A27-B3DF5C44249B}"/>
               </a:ext>
             </a:extLst>
           </p:cNvPr>
@@ -6560,7 +6561,7 @@
           <p:cNvPr id="7" name="Content Placeholder 2">
             <a:extLst>
               <a:ext uri="{FF2B5EF4-FFF2-40B4-BE49-F238E27FC236}">
-                <a16:creationId xmlns:a16="http://schemas.microsoft.com/office/drawing/2014/main" id="{7C05C4C4-6EEC-4661-9A27-B3DF5C44249B}"/>
+                <a16:creationId xmlns:a16="http://schemas.microsoft.com/office/drawing/2014/main" xmlns="" id="{7C05C4C4-6EEC-4661-9A27-B3DF5C44249B}"/>
               </a:ext>
             </a:extLst>
           </p:cNvPr>
@@ -6831,7 +6832,7 @@
           <p:cNvPr id="2" name="Title 1">
             <a:extLst>
               <a:ext uri="{FF2B5EF4-FFF2-40B4-BE49-F238E27FC236}">
-                <a16:creationId xmlns:a16="http://schemas.microsoft.com/office/drawing/2014/main" id="{9B041AF9-F244-4099-921C-28D3B50DEF3F}"/>
+                <a16:creationId xmlns:a16="http://schemas.microsoft.com/office/drawing/2014/main" xmlns="" id="{9B041AF9-F244-4099-921C-28D3B50DEF3F}"/>
               </a:ext>
             </a:extLst>
           </p:cNvPr>
@@ -6959,7 +6960,7 @@
           <p:cNvPr id="3" name="Content Placeholder 2">
             <a:extLst>
               <a:ext uri="{FF2B5EF4-FFF2-40B4-BE49-F238E27FC236}">
-                <a16:creationId xmlns:a16="http://schemas.microsoft.com/office/drawing/2014/main" id="{94B05FC5-CC67-4473-95AC-1D7FF41EF683}"/>
+                <a16:creationId xmlns:a16="http://schemas.microsoft.com/office/drawing/2014/main" xmlns="" id="{94B05FC5-CC67-4473-95AC-1D7FF41EF683}"/>
               </a:ext>
             </a:extLst>
           </p:cNvPr>
@@ -7251,7 +7252,7 @@
           <p:cNvPr id="4" name="Content Placeholder 2">
             <a:extLst>
               <a:ext uri="{FF2B5EF4-FFF2-40B4-BE49-F238E27FC236}">
-                <a16:creationId xmlns:a16="http://schemas.microsoft.com/office/drawing/2014/main" id="{94B05FC5-CC67-4473-95AC-1D7FF41EF683}"/>
+                <a16:creationId xmlns:a16="http://schemas.microsoft.com/office/drawing/2014/main" xmlns="" id="{94B05FC5-CC67-4473-95AC-1D7FF41EF683}"/>
               </a:ext>
             </a:extLst>
           </p:cNvPr>
@@ -7485,7 +7486,7 @@
           <p:cNvPr id="2" name="Title 1">
             <a:extLst>
               <a:ext uri="{FF2B5EF4-FFF2-40B4-BE49-F238E27FC236}">
-                <a16:creationId xmlns:a16="http://schemas.microsoft.com/office/drawing/2014/main" id="{9B041AF9-F244-4099-921C-28D3B50DEF3F}"/>
+                <a16:creationId xmlns:a16="http://schemas.microsoft.com/office/drawing/2014/main" xmlns="" id="{9B041AF9-F244-4099-921C-28D3B50DEF3F}"/>
               </a:ext>
             </a:extLst>
           </p:cNvPr>
@@ -7529,7 +7530,7 @@
           <p:cNvPr id="3" name="Content Placeholder 2">
             <a:extLst>
               <a:ext uri="{FF2B5EF4-FFF2-40B4-BE49-F238E27FC236}">
-                <a16:creationId xmlns:a16="http://schemas.microsoft.com/office/drawing/2014/main" id="{94B05FC5-CC67-4473-95AC-1D7FF41EF683}"/>
+                <a16:creationId xmlns:a16="http://schemas.microsoft.com/office/drawing/2014/main" xmlns="" id="{94B05FC5-CC67-4473-95AC-1D7FF41EF683}"/>
               </a:ext>
             </a:extLst>
           </p:cNvPr>
@@ -7588,7 +7589,7 @@
           <p:cNvPr id="4" name="Content Placeholder 2">
             <a:extLst>
               <a:ext uri="{FF2B5EF4-FFF2-40B4-BE49-F238E27FC236}">
-                <a16:creationId xmlns:a16="http://schemas.microsoft.com/office/drawing/2014/main" id="{94B05FC5-CC67-4473-95AC-1D7FF41EF683}"/>
+                <a16:creationId xmlns:a16="http://schemas.microsoft.com/office/drawing/2014/main" xmlns="" id="{94B05FC5-CC67-4473-95AC-1D7FF41EF683}"/>
               </a:ext>
             </a:extLst>
           </p:cNvPr>
@@ -7932,6 +7933,13 @@
   <p:clrMapOvr>
     <a:overrideClrMapping bg1="lt1" tx1="dk1" bg2="lt2" tx2="dk2" accent1="accent1" accent2="accent2" accent3="accent3" accent4="accent4" accent5="accent5" accent6="accent6" hlink="hlink" folHlink="folHlink"/>
   </p:clrMapOvr>
+  <p:timing>
+    <p:tnLst>
+      <p:par>
+        <p:cTn id="1" dur="indefinite" restart="never" nodeType="tmRoot"/>
+      </p:par>
+    </p:tnLst>
+  </p:timing>
 </p:sld>
 </file>
 
@@ -7957,7 +7965,7 @@
           <p:cNvPr id="2" name="Title 1">
             <a:extLst>
               <a:ext uri="{FF2B5EF4-FFF2-40B4-BE49-F238E27FC236}">
-                <a16:creationId xmlns:a16="http://schemas.microsoft.com/office/drawing/2014/main" id="{C6639D46-D84D-43E0-AA12-676C351F67E9}"/>
+                <a16:creationId xmlns:a16="http://schemas.microsoft.com/office/drawing/2014/main" xmlns="" id="{C6639D46-D84D-43E0-AA12-676C351F67E9}"/>
               </a:ext>
             </a:extLst>
           </p:cNvPr>
@@ -8016,7 +8024,7 @@
           <p:cNvPr id="3" name="Content Placeholder 2">
             <a:extLst>
               <a:ext uri="{FF2B5EF4-FFF2-40B4-BE49-F238E27FC236}">
-                <a16:creationId xmlns:a16="http://schemas.microsoft.com/office/drawing/2014/main" id="{A6BA5222-70D2-405F-8531-1FFB3B11AF99}"/>
+                <a16:creationId xmlns:a16="http://schemas.microsoft.com/office/drawing/2014/main" xmlns="" id="{A6BA5222-70D2-405F-8531-1FFB3B11AF99}"/>
               </a:ext>
             </a:extLst>
           </p:cNvPr>
@@ -8196,6 +8204,80 @@
   <p:clrMapOvr>
     <a:masterClrMapping/>
   </p:clrMapOvr>
+  <p:timing>
+    <p:tnLst>
+      <p:par>
+        <p:cTn id="1" dur="indefinite" restart="never" nodeType="tmRoot"/>
+      </p:par>
+    </p:tnLst>
+  </p:timing>
+</p:sld>
+</file>
+
+<file path=ppt/slides/slide7.xml><?xml version="1.0" encoding="utf-8"?>
+<p:sld xmlns:a="http://schemas.openxmlformats.org/drawingml/2006/main" xmlns:r="http://schemas.openxmlformats.org/officeDocument/2006/relationships" xmlns:p="http://schemas.openxmlformats.org/presentationml/2006/main">
+  <p:cSld>
+    <p:spTree>
+      <p:nvGrpSpPr>
+        <p:cNvPr id="1" name=""/>
+        <p:cNvGrpSpPr/>
+        <p:nvPr/>
+      </p:nvGrpSpPr>
+      <p:grpSpPr>
+        <a:xfrm>
+          <a:off x="0" y="0"/>
+          <a:ext cx="0" cy="0"/>
+          <a:chOff x="0" y="0"/>
+          <a:chExt cx="0" cy="0"/>
+        </a:xfrm>
+      </p:grpSpPr>
+      <p:pic>
+        <p:nvPicPr>
+          <p:cNvPr id="2" name="Picture 1"/>
+          <p:cNvPicPr>
+            <a:picLocks noChangeAspect="1"/>
+          </p:cNvPicPr>
+          <p:nvPr/>
+        </p:nvPicPr>
+        <p:blipFill>
+          <a:blip r:embed="rId2">
+            <a:extLst>
+              <a:ext uri="{28A0092B-C50C-407E-A947-70E740481C1C}">
+                <a14:useLocalDpi xmlns:a14="http://schemas.microsoft.com/office/drawing/2010/main" val="0"/>
+              </a:ext>
+            </a:extLst>
+          </a:blip>
+          <a:stretch>
+            <a:fillRect/>
+          </a:stretch>
+        </p:blipFill>
+        <p:spPr>
+          <a:xfrm>
+            <a:off x="0" y="-90152"/>
+            <a:ext cx="12339156" cy="6948152"/>
+          </a:xfrm>
+          <a:prstGeom prst="rect">
+            <a:avLst/>
+          </a:prstGeom>
+        </p:spPr>
+      </p:pic>
+    </p:spTree>
+    <p:extLst>
+      <p:ext uri="{BB962C8B-B14F-4D97-AF65-F5344CB8AC3E}">
+        <p14:creationId xmlns:p14="http://schemas.microsoft.com/office/powerpoint/2010/main" val="1858788763"/>
+      </p:ext>
+    </p:extLst>
+  </p:cSld>
+  <p:clrMapOvr>
+    <a:masterClrMapping/>
+  </p:clrMapOvr>
+  <p:timing>
+    <p:tnLst>
+      <p:par>
+        <p:cTn id="1" dur="indefinite" restart="never" nodeType="tmRoot"/>
+      </p:par>
+    </p:tnLst>
+  </p:timing>
 </p:sld>
 </file>
 

</xml_diff>

<commit_message>
Atualizaçaõ, simulador e arduino
</commit_message>
<xml_diff>
--- a/CONTEXTUALIZAÇÃO/CONTROL BLOCK.pptx
+++ b/CONTEXTUALIZAÇÃO/CONTROL BLOCK.pptx
@@ -288,7 +288,7 @@
           <a:p>
             <a:fld id="{3265C37F-3E1A-452E-92BE-2836DA37992B}" type="datetimeFigureOut">
               <a:rPr lang="en-US" smtClean="0"/>
-              <a:t>8/29/2019</a:t>
+              <a:t>9/2/2019</a:t>
             </a:fld>
             <a:endParaRPr lang="en-US"/>
           </a:p>
@@ -340,7 +340,7 @@
           <a:p>
             <a:fld id="{246311BE-0CA7-4D6F-B70B-9BF691300505}" type="slidenum">
               <a:rPr lang="en-US" smtClean="0"/>
-              <a:t>‹#›</a:t>
+              <a:t>‹nº›</a:t>
             </a:fld>
             <a:endParaRPr lang="en-US"/>
           </a:p>
@@ -555,7 +555,7 @@
           <a:p>
             <a:fld id="{3265C37F-3E1A-452E-92BE-2836DA37992B}" type="datetimeFigureOut">
               <a:rPr lang="en-US" smtClean="0"/>
-              <a:t>8/29/2019</a:t>
+              <a:t>9/2/2019</a:t>
             </a:fld>
             <a:endParaRPr lang="en-US"/>
           </a:p>
@@ -597,7 +597,7 @@
           <a:p>
             <a:fld id="{246311BE-0CA7-4D6F-B70B-9BF691300505}" type="slidenum">
               <a:rPr lang="en-US" smtClean="0"/>
-              <a:t>‹#›</a:t>
+              <a:t>‹nº›</a:t>
             </a:fld>
             <a:endParaRPr lang="en-US"/>
           </a:p>
@@ -786,7 +786,7 @@
           <a:p>
             <a:fld id="{3265C37F-3E1A-452E-92BE-2836DA37992B}" type="datetimeFigureOut">
               <a:rPr lang="en-US" smtClean="0"/>
-              <a:t>8/29/2019</a:t>
+              <a:t>9/2/2019</a:t>
             </a:fld>
             <a:endParaRPr lang="en-US"/>
           </a:p>
@@ -838,7 +838,7 @@
           <a:p>
             <a:fld id="{246311BE-0CA7-4D6F-B70B-9BF691300505}" type="slidenum">
               <a:rPr lang="en-US" smtClean="0"/>
-              <a:t>‹#›</a:t>
+              <a:t>‹nº›</a:t>
             </a:fld>
             <a:endParaRPr lang="en-US"/>
           </a:p>
@@ -1096,7 +1096,7 @@
           <a:p>
             <a:fld id="{3265C37F-3E1A-452E-92BE-2836DA37992B}" type="datetimeFigureOut">
               <a:rPr lang="en-US" smtClean="0"/>
-              <a:t>8/29/2019</a:t>
+              <a:t>9/2/2019</a:t>
             </a:fld>
             <a:endParaRPr lang="en-US"/>
           </a:p>
@@ -1148,7 +1148,7 @@
           <a:p>
             <a:fld id="{246311BE-0CA7-4D6F-B70B-9BF691300505}" type="slidenum">
               <a:rPr lang="en-US" smtClean="0"/>
-              <a:t>‹#›</a:t>
+              <a:t>‹nº›</a:t>
             </a:fld>
             <a:endParaRPr lang="en-US"/>
           </a:p>
@@ -1569,7 +1569,7 @@
           <a:p>
             <a:fld id="{3265C37F-3E1A-452E-92BE-2836DA37992B}" type="datetimeFigureOut">
               <a:rPr lang="en-US" smtClean="0"/>
-              <a:t>8/29/2019</a:t>
+              <a:t>9/2/2019</a:t>
             </a:fld>
             <a:endParaRPr lang="en-US"/>
           </a:p>
@@ -1621,7 +1621,7 @@
           <a:p>
             <a:fld id="{246311BE-0CA7-4D6F-B70B-9BF691300505}" type="slidenum">
               <a:rPr lang="en-US" smtClean="0"/>
-              <a:t>‹#›</a:t>
+              <a:t>‹nº›</a:t>
             </a:fld>
             <a:endParaRPr lang="en-US"/>
           </a:p>
@@ -2116,7 +2116,7 @@
           <a:p>
             <a:fld id="{3265C37F-3E1A-452E-92BE-2836DA37992B}" type="datetimeFigureOut">
               <a:rPr lang="en-US" smtClean="0"/>
-              <a:t>8/29/2019</a:t>
+              <a:t>9/2/2019</a:t>
             </a:fld>
             <a:endParaRPr lang="en-US"/>
           </a:p>
@@ -2158,7 +2158,7 @@
           <a:p>
             <a:fld id="{246311BE-0CA7-4D6F-B70B-9BF691300505}" type="slidenum">
               <a:rPr lang="en-US" smtClean="0"/>
-              <a:t>‹#›</a:t>
+              <a:t>‹nº›</a:t>
             </a:fld>
             <a:endParaRPr lang="en-US"/>
           </a:p>
@@ -2890,7 +2890,7 @@
           <a:p>
             <a:fld id="{3265C37F-3E1A-452E-92BE-2836DA37992B}" type="datetimeFigureOut">
               <a:rPr lang="en-US" smtClean="0"/>
-              <a:t>8/29/2019</a:t>
+              <a:t>9/2/2019</a:t>
             </a:fld>
             <a:endParaRPr lang="en-US"/>
           </a:p>
@@ -2932,7 +2932,7 @@
           <a:p>
             <a:fld id="{246311BE-0CA7-4D6F-B70B-9BF691300505}" type="slidenum">
               <a:rPr lang="en-US" smtClean="0"/>
-              <a:t>‹#›</a:t>
+              <a:t>‹nº›</a:t>
             </a:fld>
             <a:endParaRPr lang="en-US"/>
           </a:p>
@@ -3065,7 +3065,7 @@
           <a:p>
             <a:fld id="{3265C37F-3E1A-452E-92BE-2836DA37992B}" type="datetimeFigureOut">
               <a:rPr lang="en-US" smtClean="0"/>
-              <a:t>8/29/2019</a:t>
+              <a:t>9/2/2019</a:t>
             </a:fld>
             <a:endParaRPr lang="en-US"/>
           </a:p>
@@ -3107,7 +3107,7 @@
           <a:p>
             <a:fld id="{246311BE-0CA7-4D6F-B70B-9BF691300505}" type="slidenum">
               <a:rPr lang="en-US" smtClean="0"/>
-              <a:t>‹#›</a:t>
+              <a:t>‹nº›</a:t>
             </a:fld>
             <a:endParaRPr lang="en-US"/>
           </a:p>
@@ -3288,7 +3288,7 @@
           <a:p>
             <a:fld id="{3265C37F-3E1A-452E-92BE-2836DA37992B}" type="datetimeFigureOut">
               <a:rPr lang="en-US" smtClean="0"/>
-              <a:t>8/29/2019</a:t>
+              <a:t>9/2/2019</a:t>
             </a:fld>
             <a:endParaRPr lang="en-US"/>
           </a:p>
@@ -3340,7 +3340,7 @@
           <a:p>
             <a:fld id="{246311BE-0CA7-4D6F-B70B-9BF691300505}" type="slidenum">
               <a:rPr lang="en-US" smtClean="0"/>
-              <a:t>‹#›</a:t>
+              <a:t>‹nº›</a:t>
             </a:fld>
             <a:endParaRPr lang="en-US"/>
           </a:p>
@@ -3468,7 +3468,7 @@
           <a:p>
             <a:fld id="{3265C37F-3E1A-452E-92BE-2836DA37992B}" type="datetimeFigureOut">
               <a:rPr lang="en-US" smtClean="0"/>
-              <a:t>8/29/2019</a:t>
+              <a:t>9/2/2019</a:t>
             </a:fld>
             <a:endParaRPr lang="en-US"/>
           </a:p>
@@ -3510,7 +3510,7 @@
           <a:p>
             <a:fld id="{246311BE-0CA7-4D6F-B70B-9BF691300505}" type="slidenum">
               <a:rPr lang="en-US" smtClean="0"/>
-              <a:t>‹#›</a:t>
+              <a:t>‹nº›</a:t>
             </a:fld>
             <a:endParaRPr lang="en-US"/>
           </a:p>
@@ -3757,7 +3757,7 @@
           <a:p>
             <a:fld id="{3265C37F-3E1A-452E-92BE-2836DA37992B}" type="datetimeFigureOut">
               <a:rPr lang="en-US" smtClean="0"/>
-              <a:t>8/29/2019</a:t>
+              <a:t>9/2/2019</a:t>
             </a:fld>
             <a:endParaRPr lang="en-US"/>
           </a:p>
@@ -3809,7 +3809,7 @@
           <a:p>
             <a:fld id="{246311BE-0CA7-4D6F-B70B-9BF691300505}" type="slidenum">
               <a:rPr lang="en-US" smtClean="0"/>
-              <a:t>‹#›</a:t>
+              <a:t>‹nº›</a:t>
             </a:fld>
             <a:endParaRPr lang="en-US"/>
           </a:p>
@@ -3999,7 +3999,7 @@
           <a:p>
             <a:fld id="{3265C37F-3E1A-452E-92BE-2836DA37992B}" type="datetimeFigureOut">
               <a:rPr lang="en-US" smtClean="0"/>
-              <a:t>8/29/2019</a:t>
+              <a:t>9/2/2019</a:t>
             </a:fld>
             <a:endParaRPr lang="en-US"/>
           </a:p>
@@ -4041,7 +4041,7 @@
           <a:p>
             <a:fld id="{246311BE-0CA7-4D6F-B70B-9BF691300505}" type="slidenum">
               <a:rPr lang="en-US" smtClean="0"/>
-              <a:t>‹#›</a:t>
+              <a:t>‹nº›</a:t>
             </a:fld>
             <a:endParaRPr lang="en-US"/>
           </a:p>
@@ -4378,7 +4378,7 @@
           <a:p>
             <a:fld id="{3265C37F-3E1A-452E-92BE-2836DA37992B}" type="datetimeFigureOut">
               <a:rPr lang="en-US" smtClean="0"/>
-              <a:t>8/29/2019</a:t>
+              <a:t>9/2/2019</a:t>
             </a:fld>
             <a:endParaRPr lang="en-US"/>
           </a:p>
@@ -4420,7 +4420,7 @@
           <a:p>
             <a:fld id="{246311BE-0CA7-4D6F-B70B-9BF691300505}" type="slidenum">
               <a:rPr lang="en-US" smtClean="0"/>
-              <a:t>‹#›</a:t>
+              <a:t>‹nº›</a:t>
             </a:fld>
             <a:endParaRPr lang="en-US"/>
           </a:p>
@@ -4496,7 +4496,7 @@
           <a:p>
             <a:fld id="{3265C37F-3E1A-452E-92BE-2836DA37992B}" type="datetimeFigureOut">
               <a:rPr lang="en-US" smtClean="0"/>
-              <a:t>8/29/2019</a:t>
+              <a:t>9/2/2019</a:t>
             </a:fld>
             <a:endParaRPr lang="en-US"/>
           </a:p>
@@ -4538,7 +4538,7 @@
           <a:p>
             <a:fld id="{246311BE-0CA7-4D6F-B70B-9BF691300505}" type="slidenum">
               <a:rPr lang="en-US" smtClean="0"/>
-              <a:t>‹#›</a:t>
+              <a:t>‹nº›</a:t>
             </a:fld>
             <a:endParaRPr lang="en-US"/>
           </a:p>
@@ -4591,7 +4591,7 @@
           <a:p>
             <a:fld id="{3265C37F-3E1A-452E-92BE-2836DA37992B}" type="datetimeFigureOut">
               <a:rPr lang="en-US" smtClean="0"/>
-              <a:t>8/29/2019</a:t>
+              <a:t>9/2/2019</a:t>
             </a:fld>
             <a:endParaRPr lang="en-US"/>
           </a:p>
@@ -4633,7 +4633,7 @@
           <a:p>
             <a:fld id="{246311BE-0CA7-4D6F-B70B-9BF691300505}" type="slidenum">
               <a:rPr lang="en-US" smtClean="0"/>
-              <a:t>‹#›</a:t>
+              <a:t>‹nº›</a:t>
             </a:fld>
             <a:endParaRPr lang="en-US"/>
           </a:p>
@@ -4840,7 +4840,7 @@
           <a:p>
             <a:fld id="{3265C37F-3E1A-452E-92BE-2836DA37992B}" type="datetimeFigureOut">
               <a:rPr lang="en-US" smtClean="0"/>
-              <a:t>8/29/2019</a:t>
+              <a:t>9/2/2019</a:t>
             </a:fld>
             <a:endParaRPr lang="en-US"/>
           </a:p>
@@ -4882,7 +4882,7 @@
           <a:p>
             <a:fld id="{246311BE-0CA7-4D6F-B70B-9BF691300505}" type="slidenum">
               <a:rPr lang="en-US" smtClean="0"/>
-              <a:t>‹#›</a:t>
+              <a:t>‹nº›</a:t>
             </a:fld>
             <a:endParaRPr lang="en-US"/>
           </a:p>
@@ -5097,7 +5097,7 @@
           <a:p>
             <a:fld id="{3265C37F-3E1A-452E-92BE-2836DA37992B}" type="datetimeFigureOut">
               <a:rPr lang="en-US" smtClean="0"/>
-              <a:t>8/29/2019</a:t>
+              <a:t>9/2/2019</a:t>
             </a:fld>
             <a:endParaRPr lang="en-US"/>
           </a:p>
@@ -5139,7 +5139,7 @@
           <a:p>
             <a:fld id="{246311BE-0CA7-4D6F-B70B-9BF691300505}" type="slidenum">
               <a:rPr lang="en-US" smtClean="0"/>
-              <a:t>‹#›</a:t>
+              <a:t>‹nº›</a:t>
             </a:fld>
             <a:endParaRPr lang="en-US"/>
           </a:p>
@@ -5340,7 +5340,7 @@
           <a:p>
             <a:fld id="{3265C37F-3E1A-452E-92BE-2836DA37992B}" type="datetimeFigureOut">
               <a:rPr lang="en-US" smtClean="0"/>
-              <a:t>8/29/2019</a:t>
+              <a:t>9/2/2019</a:t>
             </a:fld>
             <a:endParaRPr lang="en-US"/>
           </a:p>
@@ -5418,7 +5418,7 @@
           <a:p>
             <a:fld id="{246311BE-0CA7-4D6F-B70B-9BF691300505}" type="slidenum">
               <a:rPr lang="en-US" smtClean="0"/>
-              <a:t>‹#›</a:t>
+              <a:t>‹nº›</a:t>
             </a:fld>
             <a:endParaRPr lang="en-US"/>
           </a:p>
@@ -5769,7 +5769,7 @@
           <p:cNvPr id="5" name="Picture 4">
             <a:extLst>
               <a:ext uri="{FF2B5EF4-FFF2-40B4-BE49-F238E27FC236}">
-                <a16:creationId xmlns:a16="http://schemas.microsoft.com/office/drawing/2014/main" xmlns="" id="{1B11FD5A-5699-4ECF-AA91-A85CB4AE659F}"/>
+                <a16:creationId xmlns:a16="http://schemas.microsoft.com/office/drawing/2014/main" id="{1B11FD5A-5699-4ECF-AA91-A85CB4AE659F}"/>
               </a:ext>
             </a:extLst>
           </p:cNvPr>
@@ -5800,7 +5800,7 @@
           <p:cNvPr id="2" name="Title 1">
             <a:extLst>
               <a:ext uri="{FF2B5EF4-FFF2-40B4-BE49-F238E27FC236}">
-                <a16:creationId xmlns:a16="http://schemas.microsoft.com/office/drawing/2014/main" xmlns="" id="{370C220C-F90F-4C37-9636-5EB6847CD125}"/>
+                <a16:creationId xmlns:a16="http://schemas.microsoft.com/office/drawing/2014/main" id="{370C220C-F90F-4C37-9636-5EB6847CD125}"/>
               </a:ext>
             </a:extLst>
           </p:cNvPr>
@@ -5847,7 +5847,7 @@
           <p:cNvPr id="3" name="Subtitle 2">
             <a:extLst>
               <a:ext uri="{FF2B5EF4-FFF2-40B4-BE49-F238E27FC236}">
-                <a16:creationId xmlns:a16="http://schemas.microsoft.com/office/drawing/2014/main" xmlns="" id="{58AB3A8B-7016-439E-BE0E-B1CA10D4E81F}"/>
+                <a16:creationId xmlns:a16="http://schemas.microsoft.com/office/drawing/2014/main" id="{58AB3A8B-7016-439E-BE0E-B1CA10D4E81F}"/>
               </a:ext>
             </a:extLst>
           </p:cNvPr>
@@ -5892,6 +5892,13 @@
   <p:clrMapOvr>
     <a:masterClrMapping/>
   </p:clrMapOvr>
+  <p:timing>
+    <p:tnLst>
+      <p:par>
+        <p:cTn id="1" dur="indefinite" restart="never" nodeType="tmRoot"/>
+      </p:par>
+    </p:tnLst>
+  </p:timing>
 </p:sld>
 </file>
 
@@ -5925,7 +5932,7 @@
           <p:cNvPr id="2" name="Title 1">
             <a:extLst>
               <a:ext uri="{FF2B5EF4-FFF2-40B4-BE49-F238E27FC236}">
-                <a16:creationId xmlns:a16="http://schemas.microsoft.com/office/drawing/2014/main" xmlns="" id="{8136CCB2-2CD7-4DBC-AA6D-E2F97F0F6421}"/>
+                <a16:creationId xmlns:a16="http://schemas.microsoft.com/office/drawing/2014/main" id="{8136CCB2-2CD7-4DBC-AA6D-E2F97F0F6421}"/>
               </a:ext>
             </a:extLst>
           </p:cNvPr>
@@ -5981,7 +5988,7 @@
           <p:cNvPr id="3" name="Content Placeholder 2">
             <a:extLst>
               <a:ext uri="{FF2B5EF4-FFF2-40B4-BE49-F238E27FC236}">
-                <a16:creationId xmlns:a16="http://schemas.microsoft.com/office/drawing/2014/main" xmlns="" id="{7C05C4C4-6EEC-4661-9A27-B3DF5C44249B}"/>
+                <a16:creationId xmlns:a16="http://schemas.microsoft.com/office/drawing/2014/main" id="{7C05C4C4-6EEC-4661-9A27-B3DF5C44249B}"/>
               </a:ext>
             </a:extLst>
           </p:cNvPr>
@@ -6025,7 +6032,7 @@
           <p:cNvPr id="4" name="Title 1">
             <a:extLst>
               <a:ext uri="{FF2B5EF4-FFF2-40B4-BE49-F238E27FC236}">
-                <a16:creationId xmlns:a16="http://schemas.microsoft.com/office/drawing/2014/main" xmlns="" id="{8136CCB2-2CD7-4DBC-AA6D-E2F97F0F6421}"/>
+                <a16:creationId xmlns:a16="http://schemas.microsoft.com/office/drawing/2014/main" id="{8136CCB2-2CD7-4DBC-AA6D-E2F97F0F6421}"/>
               </a:ext>
             </a:extLst>
           </p:cNvPr>
@@ -6100,7 +6107,7 @@
           <p:cNvPr id="5" name="Content Placeholder 2">
             <a:extLst>
               <a:ext uri="{FF2B5EF4-FFF2-40B4-BE49-F238E27FC236}">
-                <a16:creationId xmlns:a16="http://schemas.microsoft.com/office/drawing/2014/main" xmlns="" id="{7C05C4C4-6EEC-4661-9A27-B3DF5C44249B}"/>
+                <a16:creationId xmlns:a16="http://schemas.microsoft.com/office/drawing/2014/main" id="{7C05C4C4-6EEC-4661-9A27-B3DF5C44249B}"/>
               </a:ext>
             </a:extLst>
           </p:cNvPr>
@@ -6326,7 +6333,7 @@
           <p:cNvPr id="6" name="Content Placeholder 2">
             <a:extLst>
               <a:ext uri="{FF2B5EF4-FFF2-40B4-BE49-F238E27FC236}">
-                <a16:creationId xmlns:a16="http://schemas.microsoft.com/office/drawing/2014/main" xmlns="" id="{7C05C4C4-6EEC-4661-9A27-B3DF5C44249B}"/>
+                <a16:creationId xmlns:a16="http://schemas.microsoft.com/office/drawing/2014/main" id="{7C05C4C4-6EEC-4661-9A27-B3DF5C44249B}"/>
               </a:ext>
             </a:extLst>
           </p:cNvPr>
@@ -6561,7 +6568,7 @@
           <p:cNvPr id="7" name="Content Placeholder 2">
             <a:extLst>
               <a:ext uri="{FF2B5EF4-FFF2-40B4-BE49-F238E27FC236}">
-                <a16:creationId xmlns:a16="http://schemas.microsoft.com/office/drawing/2014/main" xmlns="" id="{7C05C4C4-6EEC-4661-9A27-B3DF5C44249B}"/>
+                <a16:creationId xmlns:a16="http://schemas.microsoft.com/office/drawing/2014/main" id="{7C05C4C4-6EEC-4661-9A27-B3DF5C44249B}"/>
               </a:ext>
             </a:extLst>
           </p:cNvPr>
@@ -6799,6 +6806,13 @@
   <p:clrMapOvr>
     <a:overrideClrMapping bg1="lt1" tx1="dk1" bg2="lt2" tx2="dk2" accent1="accent1" accent2="accent2" accent3="accent3" accent4="accent4" accent5="accent5" accent6="accent6" hlink="hlink" folHlink="folHlink"/>
   </p:clrMapOvr>
+  <p:timing>
+    <p:tnLst>
+      <p:par>
+        <p:cTn id="1" dur="indefinite" restart="never" nodeType="tmRoot"/>
+      </p:par>
+    </p:tnLst>
+  </p:timing>
 </p:sld>
 </file>
 
@@ -6832,7 +6846,7 @@
           <p:cNvPr id="2" name="Title 1">
             <a:extLst>
               <a:ext uri="{FF2B5EF4-FFF2-40B4-BE49-F238E27FC236}">
-                <a16:creationId xmlns:a16="http://schemas.microsoft.com/office/drawing/2014/main" xmlns="" id="{9B041AF9-F244-4099-921C-28D3B50DEF3F}"/>
+                <a16:creationId xmlns:a16="http://schemas.microsoft.com/office/drawing/2014/main" id="{9B041AF9-F244-4099-921C-28D3B50DEF3F}"/>
               </a:ext>
             </a:extLst>
           </p:cNvPr>
@@ -6960,7 +6974,7 @@
           <p:cNvPr id="3" name="Content Placeholder 2">
             <a:extLst>
               <a:ext uri="{FF2B5EF4-FFF2-40B4-BE49-F238E27FC236}">
-                <a16:creationId xmlns:a16="http://schemas.microsoft.com/office/drawing/2014/main" xmlns="" id="{94B05FC5-CC67-4473-95AC-1D7FF41EF683}"/>
+                <a16:creationId xmlns:a16="http://schemas.microsoft.com/office/drawing/2014/main" id="{94B05FC5-CC67-4473-95AC-1D7FF41EF683}"/>
               </a:ext>
             </a:extLst>
           </p:cNvPr>
@@ -7252,7 +7266,7 @@
           <p:cNvPr id="4" name="Content Placeholder 2">
             <a:extLst>
               <a:ext uri="{FF2B5EF4-FFF2-40B4-BE49-F238E27FC236}">
-                <a16:creationId xmlns:a16="http://schemas.microsoft.com/office/drawing/2014/main" xmlns="" id="{94B05FC5-CC67-4473-95AC-1D7FF41EF683}"/>
+                <a16:creationId xmlns:a16="http://schemas.microsoft.com/office/drawing/2014/main" id="{94B05FC5-CC67-4473-95AC-1D7FF41EF683}"/>
               </a:ext>
             </a:extLst>
           </p:cNvPr>
@@ -7453,6 +7467,13 @@
   <p:clrMapOvr>
     <a:overrideClrMapping bg1="lt1" tx1="dk1" bg2="lt2" tx2="dk2" accent1="accent1" accent2="accent2" accent3="accent3" accent4="accent4" accent5="accent5" accent6="accent6" hlink="hlink" folHlink="folHlink"/>
   </p:clrMapOvr>
+  <p:timing>
+    <p:tnLst>
+      <p:par>
+        <p:cTn id="1" dur="indefinite" restart="never" nodeType="tmRoot"/>
+      </p:par>
+    </p:tnLst>
+  </p:timing>
 </p:sld>
 </file>
 
@@ -7486,7 +7507,7 @@
           <p:cNvPr id="2" name="Title 1">
             <a:extLst>
               <a:ext uri="{FF2B5EF4-FFF2-40B4-BE49-F238E27FC236}">
-                <a16:creationId xmlns:a16="http://schemas.microsoft.com/office/drawing/2014/main" xmlns="" id="{9B041AF9-F244-4099-921C-28D3B50DEF3F}"/>
+                <a16:creationId xmlns:a16="http://schemas.microsoft.com/office/drawing/2014/main" id="{9B041AF9-F244-4099-921C-28D3B50DEF3F}"/>
               </a:ext>
             </a:extLst>
           </p:cNvPr>
@@ -7530,7 +7551,7 @@
           <p:cNvPr id="3" name="Content Placeholder 2">
             <a:extLst>
               <a:ext uri="{FF2B5EF4-FFF2-40B4-BE49-F238E27FC236}">
-                <a16:creationId xmlns:a16="http://schemas.microsoft.com/office/drawing/2014/main" xmlns="" id="{94B05FC5-CC67-4473-95AC-1D7FF41EF683}"/>
+                <a16:creationId xmlns:a16="http://schemas.microsoft.com/office/drawing/2014/main" id="{94B05FC5-CC67-4473-95AC-1D7FF41EF683}"/>
               </a:ext>
             </a:extLst>
           </p:cNvPr>
@@ -7589,7 +7610,7 @@
           <p:cNvPr id="4" name="Content Placeholder 2">
             <a:extLst>
               <a:ext uri="{FF2B5EF4-FFF2-40B4-BE49-F238E27FC236}">
-                <a16:creationId xmlns:a16="http://schemas.microsoft.com/office/drawing/2014/main" xmlns="" id="{94B05FC5-CC67-4473-95AC-1D7FF41EF683}"/>
+                <a16:creationId xmlns:a16="http://schemas.microsoft.com/office/drawing/2014/main" id="{94B05FC5-CC67-4473-95AC-1D7FF41EF683}"/>
               </a:ext>
             </a:extLst>
           </p:cNvPr>
@@ -7790,6 +7811,13 @@
   <p:clrMapOvr>
     <a:overrideClrMapping bg1="lt1" tx1="dk1" bg2="lt2" tx2="dk2" accent1="accent1" accent2="accent2" accent3="accent3" accent4="accent4" accent5="accent5" accent6="accent6" hlink="hlink" folHlink="folHlink"/>
   </p:clrMapOvr>
+  <p:timing>
+    <p:tnLst>
+      <p:par>
+        <p:cTn id="1" dur="indefinite" restart="never" nodeType="tmRoot"/>
+      </p:par>
+    </p:tnLst>
+  </p:timing>
 </p:sld>
 </file>
 
@@ -7965,7 +7993,7 @@
           <p:cNvPr id="2" name="Title 1">
             <a:extLst>
               <a:ext uri="{FF2B5EF4-FFF2-40B4-BE49-F238E27FC236}">
-                <a16:creationId xmlns:a16="http://schemas.microsoft.com/office/drawing/2014/main" xmlns="" id="{C6639D46-D84D-43E0-AA12-676C351F67E9}"/>
+                <a16:creationId xmlns:a16="http://schemas.microsoft.com/office/drawing/2014/main" id="{C6639D46-D84D-43E0-AA12-676C351F67E9}"/>
               </a:ext>
             </a:extLst>
           </p:cNvPr>
@@ -8024,7 +8052,7 @@
           <p:cNvPr id="3" name="Content Placeholder 2">
             <a:extLst>
               <a:ext uri="{FF2B5EF4-FFF2-40B4-BE49-F238E27FC236}">
-                <a16:creationId xmlns:a16="http://schemas.microsoft.com/office/drawing/2014/main" xmlns="" id="{A6BA5222-70D2-405F-8531-1FFB3B11AF99}"/>
+                <a16:creationId xmlns:a16="http://schemas.microsoft.com/office/drawing/2014/main" id="{A6BA5222-70D2-405F-8531-1FFB3B11AF99}"/>
               </a:ext>
             </a:extLst>
           </p:cNvPr>

</xml_diff>